<commit_message>
ietf 115 update, day2
</commit_message>
<xml_diff>
--- a/draft-ietf-opsawg-ipfix-srv6-srh-03.pptx
+++ b/draft-ietf-opsawg-ipfix-srv6-srh-03.pptx
@@ -621,7 +621,7 @@
   <pc:docChgLst>
     <pc:chgData name="Graf Thomas, INI-NET-TCZ-ZH1" userId="487bc3e3-9ce7-4cdd-b7b4-8899ea88d289" providerId="ADAL" clId="{5148AB34-802F-4E17-ABC3-D18716ECB838}"/>
     <pc:docChg chg="undo custSel addSld delSld modSld">
-      <pc:chgData name="Graf Thomas, INI-NET-TCZ-ZH1" userId="487bc3e3-9ce7-4cdd-b7b4-8899ea88d289" providerId="ADAL" clId="{5148AB34-802F-4E17-ABC3-D18716ECB838}" dt="2022-11-06T08:35:25.056" v="997" actId="20577"/>
+      <pc:chgData name="Graf Thomas, INI-NET-TCZ-ZH1" userId="487bc3e3-9ce7-4cdd-b7b4-8899ea88d289" providerId="ADAL" clId="{5148AB34-802F-4E17-ABC3-D18716ECB838}" dt="2022-11-06T11:07:08.653" v="1063" actId="1076"/>
       <pc:docMkLst>
         <pc:docMk/>
       </pc:docMkLst>
@@ -756,7 +756,7 @@
         </pc:picChg>
       </pc:sldChg>
       <pc:sldChg chg="addSp delSp modSp mod">
-        <pc:chgData name="Graf Thomas, INI-NET-TCZ-ZH1" userId="487bc3e3-9ce7-4cdd-b7b4-8899ea88d289" providerId="ADAL" clId="{5148AB34-802F-4E17-ABC3-D18716ECB838}" dt="2022-11-06T07:35:45.858" v="648" actId="20577"/>
+        <pc:chgData name="Graf Thomas, INI-NET-TCZ-ZH1" userId="487bc3e3-9ce7-4cdd-b7b4-8899ea88d289" providerId="ADAL" clId="{5148AB34-802F-4E17-ABC3-D18716ECB838}" dt="2022-11-06T11:07:08.653" v="1063" actId="1076"/>
         <pc:sldMkLst>
           <pc:docMk/>
           <pc:sldMk cId="3519410998" sldId="1060"/>
@@ -786,7 +786,15 @@
           </ac:picMkLst>
         </pc:picChg>
         <pc:picChg chg="add mod">
-          <ac:chgData name="Graf Thomas, INI-NET-TCZ-ZH1" userId="487bc3e3-9ce7-4cdd-b7b4-8899ea88d289" providerId="ADAL" clId="{5148AB34-802F-4E17-ABC3-D18716ECB838}" dt="2022-11-05T21:01:57.044" v="6" actId="14100"/>
+          <ac:chgData name="Graf Thomas, INI-NET-TCZ-ZH1" userId="487bc3e3-9ce7-4cdd-b7b4-8899ea88d289" providerId="ADAL" clId="{5148AB34-802F-4E17-ABC3-D18716ECB838}" dt="2022-11-06T11:07:08.653" v="1063" actId="1076"/>
+          <ac:picMkLst>
+            <pc:docMk/>
+            <pc:sldMk cId="3519410998" sldId="1060"/>
+            <ac:picMk id="5" creationId="{E62E7962-F047-4D74-8426-37FF1D55228B}"/>
+          </ac:picMkLst>
+        </pc:picChg>
+        <pc:picChg chg="add del mod">
+          <ac:chgData name="Graf Thomas, INI-NET-TCZ-ZH1" userId="487bc3e3-9ce7-4cdd-b7b4-8899ea88d289" providerId="ADAL" clId="{5148AB34-802F-4E17-ABC3-D18716ECB838}" dt="2022-11-06T11:06:46.721" v="1053" actId="478"/>
           <ac:picMkLst>
             <pc:docMk/>
             <pc:sldMk cId="3519410998" sldId="1060"/>
@@ -938,7 +946,7 @@
         </pc:picChg>
       </pc:sldChg>
       <pc:sldChg chg="addSp delSp modSp add del mod">
-        <pc:chgData name="Graf Thomas, INI-NET-TCZ-ZH1" userId="487bc3e3-9ce7-4cdd-b7b4-8899ea88d289" providerId="ADAL" clId="{5148AB34-802F-4E17-ABC3-D18716ECB838}" dt="2022-11-06T08:01:01.048" v="941" actId="20577"/>
+        <pc:chgData name="Graf Thomas, INI-NET-TCZ-ZH1" userId="487bc3e3-9ce7-4cdd-b7b4-8899ea88d289" providerId="ADAL" clId="{5148AB34-802F-4E17-ABC3-D18716ECB838}" dt="2022-11-06T11:01:21.544" v="1052" actId="1037"/>
         <pc:sldMkLst>
           <pc:docMk/>
           <pc:sldMk cId="1525364606" sldId="1062"/>
@@ -984,7 +992,7 @@
           </ac:spMkLst>
         </pc:spChg>
         <pc:spChg chg="add mod">
-          <ac:chgData name="Graf Thomas, INI-NET-TCZ-ZH1" userId="487bc3e3-9ce7-4cdd-b7b4-8899ea88d289" providerId="ADAL" clId="{5148AB34-802F-4E17-ABC3-D18716ECB838}" dt="2022-11-06T07:39:40.313" v="770" actId="14100"/>
+          <ac:chgData name="Graf Thomas, INI-NET-TCZ-ZH1" userId="487bc3e3-9ce7-4cdd-b7b4-8899ea88d289" providerId="ADAL" clId="{5148AB34-802F-4E17-ABC3-D18716ECB838}" dt="2022-11-06T11:00:33.575" v="1014" actId="14100"/>
           <ac:spMkLst>
             <pc:docMk/>
             <pc:sldMk cId="1525364606" sldId="1062"/>
@@ -992,7 +1000,7 @@
           </ac:spMkLst>
         </pc:spChg>
         <pc:spChg chg="add mod">
-          <ac:chgData name="Graf Thomas, INI-NET-TCZ-ZH1" userId="487bc3e3-9ce7-4cdd-b7b4-8899ea88d289" providerId="ADAL" clId="{5148AB34-802F-4E17-ABC3-D18716ECB838}" dt="2022-11-06T07:40:12.939" v="780" actId="1076"/>
+          <ac:chgData name="Graf Thomas, INI-NET-TCZ-ZH1" userId="487bc3e3-9ce7-4cdd-b7b4-8899ea88d289" providerId="ADAL" clId="{5148AB34-802F-4E17-ABC3-D18716ECB838}" dt="2022-11-06T11:01:21.544" v="1052" actId="1037"/>
           <ac:spMkLst>
             <pc:docMk/>
             <pc:sldMk cId="1525364606" sldId="1062"/>
@@ -1024,7 +1032,7 @@
           </ac:spMkLst>
         </pc:spChg>
         <pc:spChg chg="add mod">
-          <ac:chgData name="Graf Thomas, INI-NET-TCZ-ZH1" userId="487bc3e3-9ce7-4cdd-b7b4-8899ea88d289" providerId="ADAL" clId="{5148AB34-802F-4E17-ABC3-D18716ECB838}" dt="2022-11-06T07:40:29.385" v="786" actId="1076"/>
+          <ac:chgData name="Graf Thomas, INI-NET-TCZ-ZH1" userId="487bc3e3-9ce7-4cdd-b7b4-8899ea88d289" providerId="ADAL" clId="{5148AB34-802F-4E17-ABC3-D18716ECB838}" dt="2022-11-06T11:01:11.273" v="1047" actId="1037"/>
           <ac:spMkLst>
             <pc:docMk/>
             <pc:sldMk cId="1525364606" sldId="1062"/>
@@ -1056,7 +1064,7 @@
           </ac:spMkLst>
         </pc:spChg>
         <pc:spChg chg="add mod">
-          <ac:chgData name="Graf Thomas, INI-NET-TCZ-ZH1" userId="487bc3e3-9ce7-4cdd-b7b4-8899ea88d289" providerId="ADAL" clId="{5148AB34-802F-4E17-ABC3-D18716ECB838}" dt="2022-11-06T07:40:24.784" v="785" actId="1076"/>
+          <ac:chgData name="Graf Thomas, INI-NET-TCZ-ZH1" userId="487bc3e3-9ce7-4cdd-b7b4-8899ea88d289" providerId="ADAL" clId="{5148AB34-802F-4E17-ABC3-D18716ECB838}" dt="2022-11-06T11:01:01.995" v="1030" actId="1038"/>
           <ac:spMkLst>
             <pc:docMk/>
             <pc:sldMk cId="1525364606" sldId="1062"/>
@@ -1072,7 +1080,7 @@
           </ac:spMkLst>
         </pc:spChg>
         <pc:spChg chg="add mod">
-          <ac:chgData name="Graf Thomas, INI-NET-TCZ-ZH1" userId="487bc3e3-9ce7-4cdd-b7b4-8899ea88d289" providerId="ADAL" clId="{5148AB34-802F-4E17-ABC3-D18716ECB838}" dt="2022-11-06T07:40:55.451" v="789" actId="20577"/>
+          <ac:chgData name="Graf Thomas, INI-NET-TCZ-ZH1" userId="487bc3e3-9ce7-4cdd-b7b4-8899ea88d289" providerId="ADAL" clId="{5148AB34-802F-4E17-ABC3-D18716ECB838}" dt="2022-11-06T11:00:37.293" v="1015" actId="1076"/>
           <ac:spMkLst>
             <pc:docMk/>
             <pc:sldMk cId="1525364606" sldId="1062"/>
@@ -1080,7 +1088,7 @@
           </ac:spMkLst>
         </pc:spChg>
         <pc:spChg chg="add mod">
-          <ac:chgData name="Graf Thomas, INI-NET-TCZ-ZH1" userId="487bc3e3-9ce7-4cdd-b7b4-8899ea88d289" providerId="ADAL" clId="{5148AB34-802F-4E17-ABC3-D18716ECB838}" dt="2022-11-06T07:41:13.251" v="792" actId="1076"/>
+          <ac:chgData name="Graf Thomas, INI-NET-TCZ-ZH1" userId="487bc3e3-9ce7-4cdd-b7b4-8899ea88d289" providerId="ADAL" clId="{5148AB34-802F-4E17-ABC3-D18716ECB838}" dt="2022-11-06T11:01:21.544" v="1052" actId="1037"/>
           <ac:spMkLst>
             <pc:docMk/>
             <pc:sldMk cId="1525364606" sldId="1062"/>
@@ -1144,7 +1152,7 @@
           </ac:spMkLst>
         </pc:spChg>
         <pc:spChg chg="add mod">
-          <ac:chgData name="Graf Thomas, INI-NET-TCZ-ZH1" userId="487bc3e3-9ce7-4cdd-b7b4-8899ea88d289" providerId="ADAL" clId="{5148AB34-802F-4E17-ABC3-D18716ECB838}" dt="2022-11-06T07:41:53.055" v="799" actId="1076"/>
+          <ac:chgData name="Graf Thomas, INI-NET-TCZ-ZH1" userId="487bc3e3-9ce7-4cdd-b7b4-8899ea88d289" providerId="ADAL" clId="{5148AB34-802F-4E17-ABC3-D18716ECB838}" dt="2022-11-06T11:01:11.273" v="1047" actId="1037"/>
           <ac:spMkLst>
             <pc:docMk/>
             <pc:sldMk cId="1525364606" sldId="1062"/>
@@ -1152,7 +1160,7 @@
           </ac:spMkLst>
         </pc:spChg>
         <pc:spChg chg="add mod">
-          <ac:chgData name="Graf Thomas, INI-NET-TCZ-ZH1" userId="487bc3e3-9ce7-4cdd-b7b4-8899ea88d289" providerId="ADAL" clId="{5148AB34-802F-4E17-ABC3-D18716ECB838}" dt="2022-11-06T07:41:48.175" v="798" actId="20577"/>
+          <ac:chgData name="Graf Thomas, INI-NET-TCZ-ZH1" userId="487bc3e3-9ce7-4cdd-b7b4-8899ea88d289" providerId="ADAL" clId="{5148AB34-802F-4E17-ABC3-D18716ECB838}" dt="2022-11-06T11:01:01.995" v="1030" actId="1038"/>
           <ac:spMkLst>
             <pc:docMk/>
             <pc:sldMk cId="1525364606" sldId="1062"/>
@@ -1183,8 +1191,16 @@
             <ac:spMk id="48" creationId="{5E5A54A8-B22E-496A-86D5-730300746994}"/>
           </ac:spMkLst>
         </pc:spChg>
-        <pc:picChg chg="add mod">
-          <ac:chgData name="Graf Thomas, INI-NET-TCZ-ZH1" userId="487bc3e3-9ce7-4cdd-b7b4-8899ea88d289" providerId="ADAL" clId="{5148AB34-802F-4E17-ABC3-D18716ECB838}" dt="2022-11-06T07:27:53.145" v="151" actId="1076"/>
+        <pc:picChg chg="add mod ord">
+          <ac:chgData name="Graf Thomas, INI-NET-TCZ-ZH1" userId="487bc3e3-9ce7-4cdd-b7b4-8899ea88d289" providerId="ADAL" clId="{5148AB34-802F-4E17-ABC3-D18716ECB838}" dt="2022-11-06T11:00:16.015" v="1012" actId="1076"/>
+          <ac:picMkLst>
+            <pc:docMk/>
+            <pc:sldMk cId="1525364606" sldId="1062"/>
+            <ac:picMk id="4" creationId="{5D5B639C-F837-461D-B5CC-AB1BD1D1FDBB}"/>
+          </ac:picMkLst>
+        </pc:picChg>
+        <pc:picChg chg="add del mod">
+          <ac:chgData name="Graf Thomas, INI-NET-TCZ-ZH1" userId="487bc3e3-9ce7-4cdd-b7b4-8899ea88d289" providerId="ADAL" clId="{5148AB34-802F-4E17-ABC3-D18716ECB838}" dt="2022-11-06T10:59:51.771" v="998" actId="478"/>
           <ac:picMkLst>
             <pc:docMk/>
             <pc:sldMk cId="1525364606" sldId="1062"/>
@@ -1506,7 +1522,7 @@
           <a:p>
             <a:fld id="{E5E705E9-673F-4AC4-B29E-A7B26F3B8523}" type="datetimeFigureOut">
               <a:rPr lang="de-CH" smtClean="0"/>
-              <a:t>05.11.2022</a:t>
+              <a:t>06.11.2022</a:t>
             </a:fld>
             <a:endParaRPr lang="de-CH"/>
           </a:p>
@@ -1923,7 +1939,7 @@
           <a:p>
             <a:fld id="{9E9B238C-2335-4007-98C9-471C02CC43B6}" type="datetimeFigureOut">
               <a:rPr lang="de-CH" smtClean="0"/>
-              <a:t>05.11.2022</a:t>
+              <a:t>06.11.2022</a:t>
             </a:fld>
             <a:endParaRPr lang="de-CH"/>
           </a:p>
@@ -2123,7 +2139,7 @@
           <a:p>
             <a:fld id="{9E9B238C-2335-4007-98C9-471C02CC43B6}" type="datetimeFigureOut">
               <a:rPr lang="de-CH" smtClean="0"/>
-              <a:t>05.11.2022</a:t>
+              <a:t>06.11.2022</a:t>
             </a:fld>
             <a:endParaRPr lang="de-CH"/>
           </a:p>
@@ -2333,7 +2349,7 @@
           <a:p>
             <a:fld id="{9E9B238C-2335-4007-98C9-471C02CC43B6}" type="datetimeFigureOut">
               <a:rPr lang="de-CH" smtClean="0"/>
-              <a:t>05.11.2022</a:t>
+              <a:t>06.11.2022</a:t>
             </a:fld>
             <a:endParaRPr lang="de-CH"/>
           </a:p>
@@ -2533,7 +2549,7 @@
           <a:p>
             <a:fld id="{9E9B238C-2335-4007-98C9-471C02CC43B6}" type="datetimeFigureOut">
               <a:rPr lang="de-CH" smtClean="0"/>
-              <a:t>05.11.2022</a:t>
+              <a:t>06.11.2022</a:t>
             </a:fld>
             <a:endParaRPr lang="de-CH"/>
           </a:p>
@@ -2809,7 +2825,7 @@
           <a:p>
             <a:fld id="{9E9B238C-2335-4007-98C9-471C02CC43B6}" type="datetimeFigureOut">
               <a:rPr lang="de-CH" smtClean="0"/>
-              <a:t>05.11.2022</a:t>
+              <a:t>06.11.2022</a:t>
             </a:fld>
             <a:endParaRPr lang="de-CH"/>
           </a:p>
@@ -3077,7 +3093,7 @@
           <a:p>
             <a:fld id="{9E9B238C-2335-4007-98C9-471C02CC43B6}" type="datetimeFigureOut">
               <a:rPr lang="de-CH" smtClean="0"/>
-              <a:t>05.11.2022</a:t>
+              <a:t>06.11.2022</a:t>
             </a:fld>
             <a:endParaRPr lang="de-CH"/>
           </a:p>
@@ -3492,7 +3508,7 @@
           <a:p>
             <a:fld id="{9E9B238C-2335-4007-98C9-471C02CC43B6}" type="datetimeFigureOut">
               <a:rPr lang="de-CH" smtClean="0"/>
-              <a:t>05.11.2022</a:t>
+              <a:t>06.11.2022</a:t>
             </a:fld>
             <a:endParaRPr lang="de-CH"/>
           </a:p>
@@ -3634,7 +3650,7 @@
           <a:p>
             <a:fld id="{9E9B238C-2335-4007-98C9-471C02CC43B6}" type="datetimeFigureOut">
               <a:rPr lang="de-CH" smtClean="0"/>
-              <a:t>05.11.2022</a:t>
+              <a:t>06.11.2022</a:t>
             </a:fld>
             <a:endParaRPr lang="de-CH"/>
           </a:p>
@@ -3747,7 +3763,7 @@
           <a:p>
             <a:fld id="{9E9B238C-2335-4007-98C9-471C02CC43B6}" type="datetimeFigureOut">
               <a:rPr lang="de-CH" smtClean="0"/>
-              <a:t>05.11.2022</a:t>
+              <a:t>06.11.2022</a:t>
             </a:fld>
             <a:endParaRPr lang="de-CH"/>
           </a:p>
@@ -4060,7 +4076,7 @@
           <a:p>
             <a:fld id="{9E9B238C-2335-4007-98C9-471C02CC43B6}" type="datetimeFigureOut">
               <a:rPr lang="de-CH" smtClean="0"/>
-              <a:t>05.11.2022</a:t>
+              <a:t>06.11.2022</a:t>
             </a:fld>
             <a:endParaRPr lang="de-CH"/>
           </a:p>
@@ -4349,7 +4365,7 @@
           <a:p>
             <a:fld id="{9E9B238C-2335-4007-98C9-471C02CC43B6}" type="datetimeFigureOut">
               <a:rPr lang="de-CH" smtClean="0"/>
-              <a:t>05.11.2022</a:t>
+              <a:t>06.11.2022</a:t>
             </a:fld>
             <a:endParaRPr lang="de-CH"/>
           </a:p>
@@ -4592,7 +4608,7 @@
           <a:p>
             <a:fld id="{9E9B238C-2335-4007-98C9-471C02CC43B6}" type="datetimeFigureOut">
               <a:rPr lang="de-CH" smtClean="0"/>
-              <a:t>05.11.2022</a:t>
+              <a:t>06.11.2022</a:t>
             </a:fld>
             <a:endParaRPr lang="de-CH"/>
           </a:p>
@@ -7710,10 +7726,10 @@
       </p:sp>
       <p:pic>
         <p:nvPicPr>
-          <p:cNvPr id="6" name="Picture 5">
-            <a:extLst>
-              <a:ext uri="{FF2B5EF4-FFF2-40B4-BE49-F238E27FC236}">
-                <a16:creationId xmlns:a16="http://schemas.microsoft.com/office/drawing/2014/main" id="{A016ECA9-6FBE-4A1E-8744-D94B6D9F99E3}"/>
+          <p:cNvPr id="5" name="Picture 4">
+            <a:extLst>
+              <a:ext uri="{FF2B5EF4-FFF2-40B4-BE49-F238E27FC236}">
+                <a16:creationId xmlns:a16="http://schemas.microsoft.com/office/drawing/2014/main" id="{E62E7962-F047-4D74-8426-37FF1D55228B}"/>
               </a:ext>
             </a:extLst>
           </p:cNvPr>
@@ -7730,8 +7746,8 @@
         </p:blipFill>
         <p:spPr>
           <a:xfrm>
-            <a:off x="169862" y="1699588"/>
-            <a:ext cx="9375777" cy="4918027"/>
+            <a:off x="169862" y="1614932"/>
+            <a:ext cx="9431338" cy="4967215"/>
           </a:xfrm>
           <a:prstGeom prst="rect">
             <a:avLst/>
@@ -8749,12 +8765,137 @@
           </a:p>
         </p:txBody>
       </p:sp>
+      <p:sp>
+        <p:nvSpPr>
+          <p:cNvPr id="23" name="Content Placeholder 2">
+            <a:extLst>
+              <a:ext uri="{FF2B5EF4-FFF2-40B4-BE49-F238E27FC236}">
+                <a16:creationId xmlns:a16="http://schemas.microsoft.com/office/drawing/2014/main" id="{60DC7570-464B-4FC8-9924-FA59864EE277}"/>
+              </a:ext>
+            </a:extLst>
+          </p:cNvPr>
+          <p:cNvSpPr>
+            <a:spLocks noGrp="1"/>
+          </p:cNvSpPr>
+          <p:nvPr>
+            <p:ph idx="1"/>
+          </p:nvPr>
+        </p:nvSpPr>
+        <p:spPr>
+          <a:xfrm>
+            <a:off x="9385069" y="1940863"/>
+            <a:ext cx="2351302" cy="4545688"/>
+          </a:xfrm>
+        </p:spPr>
+        <p:txBody>
+          <a:bodyPr>
+            <a:noAutofit/>
+          </a:bodyPr>
+          <a:lstStyle/>
+          <a:p>
+            <a:pPr marL="342900" indent="-342900">
+              <a:lnSpc>
+                <a:spcPct val="100000"/>
+              </a:lnSpc>
+              <a:spcBef>
+                <a:spcPts val="600"/>
+              </a:spcBef>
+              <a:buFont typeface="+mj-lt"/>
+              <a:buAutoNum type="arabicParenBoth"/>
+            </a:pPr>
+            <a:r>
+              <a:rPr lang="en-US" sz="1700" dirty="0"/>
+              <a:t>With Segment List Section we can </a:t>
+            </a:r>
+            <a:r>
+              <a:rPr lang="en-US" sz="1700" b="1" dirty="0"/>
+              <a:t>select the traffic engineered path</a:t>
+            </a:r>
+            <a:r>
+              <a:rPr lang="en-US" sz="1700" dirty="0"/>
+              <a:t>.</a:t>
+            </a:r>
+          </a:p>
+          <a:p>
+            <a:pPr marL="342900" indent="-342900">
+              <a:lnSpc>
+                <a:spcPct val="100000"/>
+              </a:lnSpc>
+              <a:spcBef>
+                <a:spcPts val="600"/>
+              </a:spcBef>
+              <a:buFont typeface="+mj-lt"/>
+              <a:buAutoNum type="arabicParenBoth"/>
+            </a:pPr>
+            <a:r>
+              <a:rPr lang="en-US" sz="1700" dirty="0"/>
+              <a:t>Segments Left shows </a:t>
+            </a:r>
+            <a:r>
+              <a:rPr lang="en-US" sz="1700" b="1" dirty="0"/>
+              <a:t>where we are </a:t>
+            </a:r>
+            <a:r>
+              <a:rPr lang="en-US" sz="1700" dirty="0"/>
+              <a:t>in the forwarding path.</a:t>
+            </a:r>
+          </a:p>
+          <a:p>
+            <a:pPr marL="342900" indent="-342900">
+              <a:lnSpc>
+                <a:spcPct val="100000"/>
+              </a:lnSpc>
+              <a:spcBef>
+                <a:spcPts val="600"/>
+              </a:spcBef>
+              <a:buFont typeface="+mj-lt"/>
+              <a:buAutoNum type="arabicParenBoth"/>
+            </a:pPr>
+            <a:r>
+              <a:rPr lang="en-US" sz="1700" dirty="0"/>
+              <a:t>Active Segment </a:t>
+            </a:r>
+            <a:r>
+              <a:rPr lang="en-US" sz="1700" b="1" dirty="0"/>
+              <a:t>where we forward next to.</a:t>
+            </a:r>
+          </a:p>
+          <a:p>
+            <a:pPr marL="342900" indent="-342900">
+              <a:lnSpc>
+                <a:spcPct val="100000"/>
+              </a:lnSpc>
+              <a:spcBef>
+                <a:spcPts val="600"/>
+              </a:spcBef>
+              <a:buFont typeface="+mj-lt"/>
+              <a:buAutoNum type="arabicParenBoth"/>
+            </a:pPr>
+            <a:r>
+              <a:rPr lang="en-US" sz="1700" dirty="0"/>
+              <a:t>Peer IP </a:t>
+            </a:r>
+            <a:r>
+              <a:rPr lang="en-US" sz="1700" dirty="0" err="1"/>
+              <a:t>Src</a:t>
+            </a:r>
+            <a:r>
+              <a:rPr lang="en-US" sz="1700" dirty="0"/>
+              <a:t> from where the metrics where </a:t>
+            </a:r>
+            <a:r>
+              <a:rPr lang="en-US" sz="1700" b="1" dirty="0"/>
+              <a:t>exporter from.</a:t>
+            </a:r>
+          </a:p>
+        </p:txBody>
+      </p:sp>
       <p:pic>
         <p:nvPicPr>
-          <p:cNvPr id="7" name="Picture 6">
-            <a:extLst>
-              <a:ext uri="{FF2B5EF4-FFF2-40B4-BE49-F238E27FC236}">
-                <a16:creationId xmlns:a16="http://schemas.microsoft.com/office/drawing/2014/main" id="{07C08FC4-20DC-4E6D-B2AA-C1B98F02083D}"/>
+          <p:cNvPr id="4" name="Picture 3">
+            <a:extLst>
+              <a:ext uri="{FF2B5EF4-FFF2-40B4-BE49-F238E27FC236}">
+                <a16:creationId xmlns:a16="http://schemas.microsoft.com/office/drawing/2014/main" id="{5D5B639C-F837-461D-B5CC-AB1BD1D1FDBB}"/>
               </a:ext>
             </a:extLst>
           </p:cNvPr>
@@ -8771,8 +8912,8 @@
         </p:blipFill>
         <p:spPr>
           <a:xfrm>
-            <a:off x="946351" y="1862375"/>
-            <a:ext cx="8244871" cy="4500325"/>
+            <a:off x="288393" y="1848629"/>
+            <a:ext cx="9096676" cy="4444105"/>
           </a:xfrm>
           <a:prstGeom prst="rect">
             <a:avLst/>
@@ -8781,145 +8922,20 @@
       </p:pic>
       <p:sp>
         <p:nvSpPr>
-          <p:cNvPr id="23" name="Content Placeholder 2">
-            <a:extLst>
-              <a:ext uri="{FF2B5EF4-FFF2-40B4-BE49-F238E27FC236}">
-                <a16:creationId xmlns:a16="http://schemas.microsoft.com/office/drawing/2014/main" id="{60DC7570-464B-4FC8-9924-FA59864EE277}"/>
-              </a:ext>
-            </a:extLst>
-          </p:cNvPr>
-          <p:cNvSpPr>
-            <a:spLocks noGrp="1"/>
-          </p:cNvSpPr>
-          <p:nvPr>
-            <p:ph idx="1"/>
-          </p:nvPr>
+          <p:cNvPr id="24" name="Rectangle 23">
+            <a:extLst>
+              <a:ext uri="{FF2B5EF4-FFF2-40B4-BE49-F238E27FC236}">
+                <a16:creationId xmlns:a16="http://schemas.microsoft.com/office/drawing/2014/main" id="{34A2D270-5EDD-462E-BF0C-98FC51B4F083}"/>
+              </a:ext>
+            </a:extLst>
+          </p:cNvPr>
+          <p:cNvSpPr/>
+          <p:nvPr/>
         </p:nvSpPr>
         <p:spPr>
           <a:xfrm>
-            <a:off x="9385069" y="1940863"/>
-            <a:ext cx="2351302" cy="4545688"/>
-          </a:xfrm>
-        </p:spPr>
-        <p:txBody>
-          <a:bodyPr>
-            <a:noAutofit/>
-          </a:bodyPr>
-          <a:lstStyle/>
-          <a:p>
-            <a:pPr marL="342900" indent="-342900">
-              <a:lnSpc>
-                <a:spcPct val="100000"/>
-              </a:lnSpc>
-              <a:spcBef>
-                <a:spcPts val="600"/>
-              </a:spcBef>
-              <a:buFont typeface="+mj-lt"/>
-              <a:buAutoNum type="arabicParenBoth"/>
-            </a:pPr>
-            <a:r>
-              <a:rPr lang="en-US" sz="1700" dirty="0"/>
-              <a:t>With Segment List Section we can </a:t>
-            </a:r>
-            <a:r>
-              <a:rPr lang="en-US" sz="1700" b="1" dirty="0"/>
-              <a:t>select the traffic engineered path</a:t>
-            </a:r>
-            <a:r>
-              <a:rPr lang="en-US" sz="1700" dirty="0"/>
-              <a:t>.</a:t>
-            </a:r>
-          </a:p>
-          <a:p>
-            <a:pPr marL="342900" indent="-342900">
-              <a:lnSpc>
-                <a:spcPct val="100000"/>
-              </a:lnSpc>
-              <a:spcBef>
-                <a:spcPts val="600"/>
-              </a:spcBef>
-              <a:buFont typeface="+mj-lt"/>
-              <a:buAutoNum type="arabicParenBoth"/>
-            </a:pPr>
-            <a:r>
-              <a:rPr lang="en-US" sz="1700" dirty="0"/>
-              <a:t>Segments Left shows </a:t>
-            </a:r>
-            <a:r>
-              <a:rPr lang="en-US" sz="1700" b="1" dirty="0"/>
-              <a:t>where we are </a:t>
-            </a:r>
-            <a:r>
-              <a:rPr lang="en-US" sz="1700" dirty="0"/>
-              <a:t>in the forwarding path.</a:t>
-            </a:r>
-          </a:p>
-          <a:p>
-            <a:pPr marL="342900" indent="-342900">
-              <a:lnSpc>
-                <a:spcPct val="100000"/>
-              </a:lnSpc>
-              <a:spcBef>
-                <a:spcPts val="600"/>
-              </a:spcBef>
-              <a:buFont typeface="+mj-lt"/>
-              <a:buAutoNum type="arabicParenBoth"/>
-            </a:pPr>
-            <a:r>
-              <a:rPr lang="en-US" sz="1700" dirty="0"/>
-              <a:t>Active Segment </a:t>
-            </a:r>
-            <a:r>
-              <a:rPr lang="en-US" sz="1700" b="1" dirty="0"/>
-              <a:t>where we forward next to.</a:t>
-            </a:r>
-          </a:p>
-          <a:p>
-            <a:pPr marL="342900" indent="-342900">
-              <a:lnSpc>
-                <a:spcPct val="100000"/>
-              </a:lnSpc>
-              <a:spcBef>
-                <a:spcPts val="600"/>
-              </a:spcBef>
-              <a:buFont typeface="+mj-lt"/>
-              <a:buAutoNum type="arabicParenBoth"/>
-            </a:pPr>
-            <a:r>
-              <a:rPr lang="en-US" sz="1700" dirty="0"/>
-              <a:t>Peer IP </a:t>
-            </a:r>
-            <a:r>
-              <a:rPr lang="en-US" sz="1700" dirty="0" err="1"/>
-              <a:t>Src</a:t>
-            </a:r>
-            <a:r>
-              <a:rPr lang="en-US" sz="1700" dirty="0"/>
-              <a:t> from where the metrics where </a:t>
-            </a:r>
-            <a:r>
-              <a:rPr lang="en-US" sz="1700" b="1" dirty="0"/>
-              <a:t>exporter from.</a:t>
-            </a:r>
-          </a:p>
-        </p:txBody>
-      </p:sp>
-      <p:sp>
-        <p:nvSpPr>
-          <p:cNvPr id="24" name="Rectangle 23">
-            <a:extLst>
-              <a:ext uri="{FF2B5EF4-FFF2-40B4-BE49-F238E27FC236}">
-                <a16:creationId xmlns:a16="http://schemas.microsoft.com/office/drawing/2014/main" id="{34A2D270-5EDD-462E-BF0C-98FC51B4F083}"/>
-              </a:ext>
-            </a:extLst>
-          </p:cNvPr>
-          <p:cNvSpPr/>
-          <p:nvPr/>
-        </p:nvSpPr>
-        <p:spPr>
-          <a:xfrm>
-            <a:off x="7456516" y="3136367"/>
-            <a:ext cx="1734706" cy="292633"/>
+            <a:off x="7456515" y="2419005"/>
+            <a:ext cx="1928553" cy="1009996"/>
           </a:xfrm>
           <a:prstGeom prst="rect">
             <a:avLst/>
@@ -8970,7 +8986,7 @@
         </p:nvSpPr>
         <p:spPr>
           <a:xfrm>
-            <a:off x="2412221" y="2709542"/>
+            <a:off x="1914170" y="2244164"/>
             <a:ext cx="863911" cy="169866"/>
           </a:xfrm>
           <a:prstGeom prst="rect">
@@ -9022,7 +9038,7 @@
         </p:nvSpPr>
         <p:spPr>
           <a:xfrm>
-            <a:off x="3308548" y="2709542"/>
+            <a:off x="2900875" y="2244164"/>
             <a:ext cx="863911" cy="169866"/>
           </a:xfrm>
           <a:prstGeom prst="rect">
@@ -9074,7 +9090,7 @@
         </p:nvSpPr>
         <p:spPr>
           <a:xfrm>
-            <a:off x="4204875" y="2709542"/>
+            <a:off x="3887576" y="2244164"/>
             <a:ext cx="863911" cy="169866"/>
           </a:xfrm>
           <a:prstGeom prst="rect">
@@ -9126,7 +9142,7 @@
         </p:nvSpPr>
         <p:spPr>
           <a:xfrm>
-            <a:off x="7130993" y="3158858"/>
+            <a:off x="7170748" y="2585717"/>
             <a:ext cx="228600" cy="247650"/>
           </a:xfrm>
           <a:prstGeom prst="ellipse">
@@ -9190,7 +9206,7 @@
         </p:nvSpPr>
         <p:spPr>
           <a:xfrm>
-            <a:off x="2615576" y="2927270"/>
+            <a:off x="2117525" y="2461892"/>
             <a:ext cx="228600" cy="247650"/>
           </a:xfrm>
           <a:prstGeom prst="ellipse">
@@ -9254,7 +9270,7 @@
         </p:nvSpPr>
         <p:spPr>
           <a:xfrm>
-            <a:off x="3569053" y="2911208"/>
+            <a:off x="3161380" y="2445830"/>
             <a:ext cx="228600" cy="247650"/>
           </a:xfrm>
           <a:prstGeom prst="ellipse">
@@ -9318,7 +9334,7 @@
         </p:nvSpPr>
         <p:spPr>
           <a:xfrm>
-            <a:off x="4522530" y="2927270"/>
+            <a:off x="4205231" y="2461892"/>
             <a:ext cx="228600" cy="247650"/>
           </a:xfrm>
           <a:prstGeom prst="ellipse">

</xml_diff>